<commit_message>
* updated the project
This is not the final yet
</commit_message>
<xml_diff>
--- a/project desc and proposal.pptx
+++ b/project desc and proposal.pptx
@@ -14,9 +14,9 @@
     <p:sldId id="259" r:id="rId5"/>
     <p:sldId id="260" r:id="rId6"/>
     <p:sldId id="261" r:id="rId7"/>
-    <p:sldId id="262" r:id="rId8"/>
-    <p:sldId id="263" r:id="rId9"/>
-    <p:sldId id="266" r:id="rId10"/>
+    <p:sldId id="266" r:id="rId8"/>
+    <p:sldId id="262" r:id="rId9"/>
+    <p:sldId id="263" r:id="rId10"/>
     <p:sldId id="264" r:id="rId11"/>
     <p:sldId id="265" r:id="rId12"/>
   </p:sldIdLst>
@@ -207,7 +207,7 @@
           <a:p>
             <a:fld id="{06FB2D67-8587-48DB-B8D6-56447E815728}" type="datetimeFigureOut">
               <a:rPr lang="en-CA" smtClean="0"/>
-              <a:t>07/03/2018</a:t>
+              <a:t>2018-03-08</a:t>
             </a:fld>
             <a:endParaRPr lang="en-CA"/>
           </a:p>
@@ -609,7 +609,7 @@
           <a:noFill/>
           <a:extLst>
             <a:ext uri="{909E8E84-426E-40dd-AFC4-6F175D3DCCD1}">
-              <a14:hiddenFill xmlns="" xmlns:a14="http://schemas.microsoft.com/office/drawing/2010/main">
+              <a14:hiddenFill xmlns:a14="http://schemas.microsoft.com/office/drawing/2010/main" xmlns="">
                 <a:solidFill>
                   <a:srgbClr val="FFFFFF"/>
                 </a:solidFill>
@@ -669,7 +669,7 @@
             </a:ln>
             <a:extLst>
               <a:ext uri="{91240B29-F687-4f45-9708-019B960494DF}">
-                <a14:hiddenLine xmlns="" xmlns:a14="http://schemas.microsoft.com/office/drawing/2010/main" w="9525">
+                <a14:hiddenLine xmlns:a14="http://schemas.microsoft.com/office/drawing/2010/main" xmlns="" w="9525">
                   <a:solidFill>
                     <a:srgbClr val="000000"/>
                   </a:solidFill>
@@ -759,7 +759,7 @@
             </a:ln>
             <a:extLst>
               <a:ext uri="{91240B29-F687-4f45-9708-019B960494DF}">
-                <a14:hiddenLine xmlns="" xmlns:a14="http://schemas.microsoft.com/office/drawing/2010/main" w="9525">
+                <a14:hiddenLine xmlns:a14="http://schemas.microsoft.com/office/drawing/2010/main" xmlns="" w="9525">
                   <a:solidFill>
                     <a:srgbClr val="000000"/>
                   </a:solidFill>
@@ -849,7 +849,7 @@
             </a:ln>
             <a:extLst>
               <a:ext uri="{91240B29-F687-4f45-9708-019B960494DF}">
-                <a14:hiddenLine xmlns="" xmlns:a14="http://schemas.microsoft.com/office/drawing/2010/main" w="9525">
+                <a14:hiddenLine xmlns:a14="http://schemas.microsoft.com/office/drawing/2010/main" xmlns="" w="9525">
                   <a:solidFill>
                     <a:srgbClr val="000000"/>
                   </a:solidFill>
@@ -883,7 +883,7 @@
             </a:ln>
             <a:extLst>
               <a:ext uri="{91240B29-F687-4f45-9708-019B960494DF}">
-                <a14:hiddenLine xmlns="" xmlns:a14="http://schemas.microsoft.com/office/drawing/2010/main" w="9525">
+                <a14:hiddenLine xmlns:a14="http://schemas.microsoft.com/office/drawing/2010/main" xmlns="" w="9525">
                   <a:solidFill>
                     <a:srgbClr val="000000"/>
                   </a:solidFill>
@@ -973,7 +973,7 @@
             </a:ln>
             <a:extLst>
               <a:ext uri="{91240B29-F687-4f45-9708-019B960494DF}">
-                <a14:hiddenLine xmlns="" xmlns:a14="http://schemas.microsoft.com/office/drawing/2010/main" w="9525">
+                <a14:hiddenLine xmlns:a14="http://schemas.microsoft.com/office/drawing/2010/main" xmlns="" w="9525">
                   <a:solidFill>
                     <a:srgbClr val="000000"/>
                   </a:solidFill>
@@ -1035,7 +1035,7 @@
             </a:ln>
             <a:extLst>
               <a:ext uri="{91240B29-F687-4f45-9708-019B960494DF}">
-                <a14:hiddenLine xmlns="" xmlns:a14="http://schemas.microsoft.com/office/drawing/2010/main" w="9525">
+                <a14:hiddenLine xmlns:a14="http://schemas.microsoft.com/office/drawing/2010/main" xmlns="" w="9525">
                   <a:solidFill>
                     <a:srgbClr val="000000"/>
                   </a:solidFill>
@@ -1097,7 +1097,7 @@
             </a:ln>
             <a:extLst>
               <a:ext uri="{91240B29-F687-4f45-9708-019B960494DF}">
-                <a14:hiddenLine xmlns="" xmlns:a14="http://schemas.microsoft.com/office/drawing/2010/main" w="9525">
+                <a14:hiddenLine xmlns:a14="http://schemas.microsoft.com/office/drawing/2010/main" xmlns="" w="9525">
                   <a:solidFill>
                     <a:srgbClr val="000000"/>
                   </a:solidFill>
@@ -1187,7 +1187,7 @@
             </a:ln>
             <a:extLst>
               <a:ext uri="{91240B29-F687-4f45-9708-019B960494DF}">
-                <a14:hiddenLine xmlns="" xmlns:a14="http://schemas.microsoft.com/office/drawing/2010/main" w="9525">
+                <a14:hiddenLine xmlns:a14="http://schemas.microsoft.com/office/drawing/2010/main" xmlns="" w="9525">
                   <a:solidFill>
                     <a:srgbClr val="000000"/>
                   </a:solidFill>
@@ -1249,7 +1249,7 @@
             </a:ln>
             <a:extLst>
               <a:ext uri="{91240B29-F687-4f45-9708-019B960494DF}">
-                <a14:hiddenLine xmlns="" xmlns:a14="http://schemas.microsoft.com/office/drawing/2010/main" w="9525">
+                <a14:hiddenLine xmlns:a14="http://schemas.microsoft.com/office/drawing/2010/main" xmlns="" w="9525">
                   <a:solidFill>
                     <a:srgbClr val="000000"/>
                   </a:solidFill>
@@ -1311,7 +1311,7 @@
             </a:ln>
             <a:extLst>
               <a:ext uri="{91240B29-F687-4f45-9708-019B960494DF}">
-                <a14:hiddenLine xmlns="" xmlns:a14="http://schemas.microsoft.com/office/drawing/2010/main" w="9525">
+                <a14:hiddenLine xmlns:a14="http://schemas.microsoft.com/office/drawing/2010/main" xmlns="" w="9525">
                   <a:solidFill>
                     <a:srgbClr val="000000"/>
                   </a:solidFill>
@@ -1401,7 +1401,7 @@
             </a:ln>
             <a:extLst>
               <a:ext uri="{91240B29-F687-4f45-9708-019B960494DF}">
-                <a14:hiddenLine xmlns="" xmlns:a14="http://schemas.microsoft.com/office/drawing/2010/main" w="9525">
+                <a14:hiddenLine xmlns:a14="http://schemas.microsoft.com/office/drawing/2010/main" xmlns="" w="9525">
                   <a:solidFill>
                     <a:srgbClr val="000000"/>
                   </a:solidFill>
@@ -1491,7 +1491,7 @@
             </a:ln>
             <a:extLst>
               <a:ext uri="{91240B29-F687-4f45-9708-019B960494DF}">
-                <a14:hiddenLine xmlns="" xmlns:a14="http://schemas.microsoft.com/office/drawing/2010/main" w="9525">
+                <a14:hiddenLine xmlns:a14="http://schemas.microsoft.com/office/drawing/2010/main" xmlns="" w="9525">
                   <a:solidFill>
                     <a:srgbClr val="000000"/>
                   </a:solidFill>
@@ -1553,7 +1553,7 @@
             </a:ln>
             <a:extLst>
               <a:ext uri="{91240B29-F687-4f45-9708-019B960494DF}">
-                <a14:hiddenLine xmlns="" xmlns:a14="http://schemas.microsoft.com/office/drawing/2010/main" w="9525">
+                <a14:hiddenLine xmlns:a14="http://schemas.microsoft.com/office/drawing/2010/main" xmlns="" w="9525">
                   <a:solidFill>
                     <a:srgbClr val="000000"/>
                   </a:solidFill>
@@ -1663,7 +1663,7 @@
             </a:ln>
             <a:extLst>
               <a:ext uri="{91240B29-F687-4f45-9708-019B960494DF}">
-                <a14:hiddenLine xmlns="" xmlns:a14="http://schemas.microsoft.com/office/drawing/2010/main" w="9525">
+                <a14:hiddenLine xmlns:a14="http://schemas.microsoft.com/office/drawing/2010/main" xmlns="" w="9525">
                   <a:solidFill>
                     <a:srgbClr val="000000"/>
                   </a:solidFill>
@@ -1725,7 +1725,7 @@
             </a:ln>
             <a:extLst>
               <a:ext uri="{91240B29-F687-4f45-9708-019B960494DF}">
-                <a14:hiddenLine xmlns="" xmlns:a14="http://schemas.microsoft.com/office/drawing/2010/main" w="9525">
+                <a14:hiddenLine xmlns:a14="http://schemas.microsoft.com/office/drawing/2010/main" xmlns="" w="9525">
                   <a:solidFill>
                     <a:srgbClr val="000000"/>
                   </a:solidFill>
@@ -1815,7 +1815,7 @@
             </a:ln>
             <a:extLst>
               <a:ext uri="{91240B29-F687-4f45-9708-019B960494DF}">
-                <a14:hiddenLine xmlns="" xmlns:a14="http://schemas.microsoft.com/office/drawing/2010/main" w="9525">
+                <a14:hiddenLine xmlns:a14="http://schemas.microsoft.com/office/drawing/2010/main" xmlns="" w="9525">
                   <a:solidFill>
                     <a:srgbClr val="000000"/>
                   </a:solidFill>
@@ -1905,7 +1905,7 @@
             </a:ln>
             <a:extLst>
               <a:ext uri="{91240B29-F687-4f45-9708-019B960494DF}">
-                <a14:hiddenLine xmlns="" xmlns:a14="http://schemas.microsoft.com/office/drawing/2010/main" w="9525">
+                <a14:hiddenLine xmlns:a14="http://schemas.microsoft.com/office/drawing/2010/main" xmlns="" w="9525">
                   <a:solidFill>
                     <a:srgbClr val="000000"/>
                   </a:solidFill>
@@ -1967,7 +1967,7 @@
             </a:ln>
             <a:extLst>
               <a:ext uri="{91240B29-F687-4f45-9708-019B960494DF}">
-                <a14:hiddenLine xmlns="" xmlns:a14="http://schemas.microsoft.com/office/drawing/2010/main" w="9525">
+                <a14:hiddenLine xmlns:a14="http://schemas.microsoft.com/office/drawing/2010/main" xmlns="" w="9525">
                   <a:solidFill>
                     <a:srgbClr val="000000"/>
                   </a:solidFill>
@@ -2057,7 +2057,7 @@
             </a:ln>
             <a:extLst>
               <a:ext uri="{91240B29-F687-4f45-9708-019B960494DF}">
-                <a14:hiddenLine xmlns="" xmlns:a14="http://schemas.microsoft.com/office/drawing/2010/main" w="9525">
+                <a14:hiddenLine xmlns:a14="http://schemas.microsoft.com/office/drawing/2010/main" xmlns="" w="9525">
                   <a:solidFill>
                     <a:srgbClr val="000000"/>
                   </a:solidFill>
@@ -2147,7 +2147,7 @@
             </a:ln>
             <a:extLst>
               <a:ext uri="{91240B29-F687-4f45-9708-019B960494DF}">
-                <a14:hiddenLine xmlns="" xmlns:a14="http://schemas.microsoft.com/office/drawing/2010/main" w="9525">
+                <a14:hiddenLine xmlns:a14="http://schemas.microsoft.com/office/drawing/2010/main" xmlns="" w="9525">
                   <a:solidFill>
                     <a:srgbClr val="000000"/>
                   </a:solidFill>
@@ -2203,7 +2203,7 @@
             </a:ln>
             <a:extLst>
               <a:ext uri="{91240B29-F687-4f45-9708-019B960494DF}">
-                <a14:hiddenLine xmlns="" xmlns:a14="http://schemas.microsoft.com/office/drawing/2010/main" w="9525">
+                <a14:hiddenLine xmlns:a14="http://schemas.microsoft.com/office/drawing/2010/main" xmlns="" w="9525">
                   <a:solidFill>
                     <a:srgbClr val="000000"/>
                   </a:solidFill>
@@ -2293,7 +2293,7 @@
             </a:ln>
             <a:extLst>
               <a:ext uri="{91240B29-F687-4f45-9708-019B960494DF}">
-                <a14:hiddenLine xmlns="" xmlns:a14="http://schemas.microsoft.com/office/drawing/2010/main" w="9525">
+                <a14:hiddenLine xmlns:a14="http://schemas.microsoft.com/office/drawing/2010/main" xmlns="" w="9525">
                   <a:solidFill>
                     <a:srgbClr val="000000"/>
                   </a:solidFill>
@@ -2349,7 +2349,7 @@
             </a:ln>
             <a:extLst>
               <a:ext uri="{91240B29-F687-4f45-9708-019B960494DF}">
-                <a14:hiddenLine xmlns="" xmlns:a14="http://schemas.microsoft.com/office/drawing/2010/main" w="9525">
+                <a14:hiddenLine xmlns:a14="http://schemas.microsoft.com/office/drawing/2010/main" xmlns="" w="9525">
                   <a:solidFill>
                     <a:srgbClr val="000000"/>
                   </a:solidFill>
@@ -2439,7 +2439,7 @@
             </a:ln>
             <a:extLst>
               <a:ext uri="{91240B29-F687-4f45-9708-019B960494DF}">
-                <a14:hiddenLine xmlns="" xmlns:a14="http://schemas.microsoft.com/office/drawing/2010/main" w="9525">
+                <a14:hiddenLine xmlns:a14="http://schemas.microsoft.com/office/drawing/2010/main" xmlns="" w="9525">
                   <a:solidFill>
                     <a:srgbClr val="000000"/>
                   </a:solidFill>
@@ -2507,7 +2507,7 @@
             </a:ln>
             <a:extLst>
               <a:ext uri="{91240B29-F687-4f45-9708-019B960494DF}">
-                <a14:hiddenLine xmlns="" xmlns:a14="http://schemas.microsoft.com/office/drawing/2010/main" w="9525">
+                <a14:hiddenLine xmlns:a14="http://schemas.microsoft.com/office/drawing/2010/main" xmlns="" w="9525">
                   <a:solidFill>
                     <a:srgbClr val="000000"/>
                   </a:solidFill>
@@ -2597,7 +2597,7 @@
             </a:ln>
             <a:extLst>
               <a:ext uri="{91240B29-F687-4f45-9708-019B960494DF}">
-                <a14:hiddenLine xmlns="" xmlns:a14="http://schemas.microsoft.com/office/drawing/2010/main" w="9525">
+                <a14:hiddenLine xmlns:a14="http://schemas.microsoft.com/office/drawing/2010/main" xmlns="" w="9525">
                   <a:solidFill>
                     <a:srgbClr val="000000"/>
                   </a:solidFill>
@@ -2665,7 +2665,7 @@
             </a:ln>
             <a:extLst>
               <a:ext uri="{91240B29-F687-4f45-9708-019B960494DF}">
-                <a14:hiddenLine xmlns="" xmlns:a14="http://schemas.microsoft.com/office/drawing/2010/main" w="9525">
+                <a14:hiddenLine xmlns:a14="http://schemas.microsoft.com/office/drawing/2010/main" xmlns="" w="9525">
                   <a:solidFill>
                     <a:srgbClr val="000000"/>
                   </a:solidFill>
@@ -2755,7 +2755,7 @@
             </a:ln>
             <a:extLst>
               <a:ext uri="{91240B29-F687-4f45-9708-019B960494DF}">
-                <a14:hiddenLine xmlns="" xmlns:a14="http://schemas.microsoft.com/office/drawing/2010/main" w="9525">
+                <a14:hiddenLine xmlns:a14="http://schemas.microsoft.com/office/drawing/2010/main" xmlns="" w="9525">
                   <a:solidFill>
                     <a:srgbClr val="000000"/>
                   </a:solidFill>
@@ -2789,7 +2789,7 @@
             </a:ln>
             <a:extLst>
               <a:ext uri="{91240B29-F687-4f45-9708-019B960494DF}">
-                <a14:hiddenLine xmlns="" xmlns:a14="http://schemas.microsoft.com/office/drawing/2010/main" w="9525">
+                <a14:hiddenLine xmlns:a14="http://schemas.microsoft.com/office/drawing/2010/main" xmlns="" w="9525">
                   <a:solidFill>
                     <a:srgbClr val="000000"/>
                   </a:solidFill>
@@ -2879,7 +2879,7 @@
             </a:ln>
             <a:extLst>
               <a:ext uri="{91240B29-F687-4f45-9708-019B960494DF}">
-                <a14:hiddenLine xmlns="" xmlns:a14="http://schemas.microsoft.com/office/drawing/2010/main" w="9525">
+                <a14:hiddenLine xmlns:a14="http://schemas.microsoft.com/office/drawing/2010/main" xmlns="" w="9525">
                   <a:solidFill>
                     <a:srgbClr val="000000"/>
                   </a:solidFill>
@@ -2941,7 +2941,7 @@
             </a:ln>
             <a:extLst>
               <a:ext uri="{91240B29-F687-4f45-9708-019B960494DF}">
-                <a14:hiddenLine xmlns="" xmlns:a14="http://schemas.microsoft.com/office/drawing/2010/main" w="9525">
+                <a14:hiddenLine xmlns:a14="http://schemas.microsoft.com/office/drawing/2010/main" xmlns="" w="9525">
                   <a:solidFill>
                     <a:srgbClr val="000000"/>
                   </a:solidFill>
@@ -3003,7 +3003,7 @@
             </a:ln>
             <a:extLst>
               <a:ext uri="{91240B29-F687-4f45-9708-019B960494DF}">
-                <a14:hiddenLine xmlns="" xmlns:a14="http://schemas.microsoft.com/office/drawing/2010/main" w="9525">
+                <a14:hiddenLine xmlns:a14="http://schemas.microsoft.com/office/drawing/2010/main" xmlns="" w="9525">
                   <a:solidFill>
                     <a:srgbClr val="000000"/>
                   </a:solidFill>
@@ -3093,7 +3093,7 @@
             </a:ln>
             <a:extLst>
               <a:ext uri="{91240B29-F687-4f45-9708-019B960494DF}">
-                <a14:hiddenLine xmlns="" xmlns:a14="http://schemas.microsoft.com/office/drawing/2010/main" w="9525">
+                <a14:hiddenLine xmlns:a14="http://schemas.microsoft.com/office/drawing/2010/main" xmlns="" w="9525">
                   <a:solidFill>
                     <a:srgbClr val="000000"/>
                   </a:solidFill>
@@ -3161,7 +3161,7 @@
             </a:ln>
             <a:extLst>
               <a:ext uri="{91240B29-F687-4f45-9708-019B960494DF}">
-                <a14:hiddenLine xmlns="" xmlns:a14="http://schemas.microsoft.com/office/drawing/2010/main" w="9525">
+                <a14:hiddenLine xmlns:a14="http://schemas.microsoft.com/office/drawing/2010/main" xmlns="" w="9525">
                   <a:solidFill>
                     <a:srgbClr val="000000"/>
                   </a:solidFill>
@@ -3223,7 +3223,7 @@
             </a:ln>
             <a:extLst>
               <a:ext uri="{91240B29-F687-4f45-9708-019B960494DF}">
-                <a14:hiddenLine xmlns="" xmlns:a14="http://schemas.microsoft.com/office/drawing/2010/main" w="9525">
+                <a14:hiddenLine xmlns:a14="http://schemas.microsoft.com/office/drawing/2010/main" xmlns="" w="9525">
                   <a:solidFill>
                     <a:srgbClr val="000000"/>
                   </a:solidFill>
@@ -3313,7 +3313,7 @@
             </a:ln>
             <a:extLst>
               <a:ext uri="{91240B29-F687-4f45-9708-019B960494DF}">
-                <a14:hiddenLine xmlns="" xmlns:a14="http://schemas.microsoft.com/office/drawing/2010/main" w="9525">
+                <a14:hiddenLine xmlns:a14="http://schemas.microsoft.com/office/drawing/2010/main" xmlns="" w="9525">
                   <a:solidFill>
                     <a:srgbClr val="000000"/>
                   </a:solidFill>
@@ -3375,7 +3375,7 @@
             </a:ln>
             <a:extLst>
               <a:ext uri="{91240B29-F687-4f45-9708-019B960494DF}">
-                <a14:hiddenLine xmlns="" xmlns:a14="http://schemas.microsoft.com/office/drawing/2010/main" w="9525">
+                <a14:hiddenLine xmlns:a14="http://schemas.microsoft.com/office/drawing/2010/main" xmlns="" w="9525">
                   <a:solidFill>
                     <a:srgbClr val="000000"/>
                   </a:solidFill>
@@ -3465,7 +3465,7 @@
             </a:ln>
             <a:extLst>
               <a:ext uri="{91240B29-F687-4f45-9708-019B960494DF}">
-                <a14:hiddenLine xmlns="" xmlns:a14="http://schemas.microsoft.com/office/drawing/2010/main" w="9525">
+                <a14:hiddenLine xmlns:a14="http://schemas.microsoft.com/office/drawing/2010/main" xmlns="" w="9525">
                   <a:solidFill>
                     <a:srgbClr val="000000"/>
                   </a:solidFill>
@@ -3527,7 +3527,7 @@
             </a:ln>
             <a:extLst>
               <a:ext uri="{91240B29-F687-4f45-9708-019B960494DF}">
-                <a14:hiddenLine xmlns="" xmlns:a14="http://schemas.microsoft.com/office/drawing/2010/main" w="9525">
+                <a14:hiddenLine xmlns:a14="http://schemas.microsoft.com/office/drawing/2010/main" xmlns="" w="9525">
                   <a:solidFill>
                     <a:srgbClr val="000000"/>
                   </a:solidFill>
@@ -3617,7 +3617,7 @@
             </a:ln>
             <a:extLst>
               <a:ext uri="{91240B29-F687-4f45-9708-019B960494DF}">
-                <a14:hiddenLine xmlns="" xmlns:a14="http://schemas.microsoft.com/office/drawing/2010/main" w="9525">
+                <a14:hiddenLine xmlns:a14="http://schemas.microsoft.com/office/drawing/2010/main" xmlns="" w="9525">
                   <a:solidFill>
                     <a:srgbClr val="000000"/>
                   </a:solidFill>
@@ -3651,7 +3651,7 @@
             </a:ln>
             <a:extLst>
               <a:ext uri="{91240B29-F687-4f45-9708-019B960494DF}">
-                <a14:hiddenLine xmlns="" xmlns:a14="http://schemas.microsoft.com/office/drawing/2010/main" w="9525">
+                <a14:hiddenLine xmlns:a14="http://schemas.microsoft.com/office/drawing/2010/main" xmlns="" w="9525">
                   <a:solidFill>
                     <a:srgbClr val="000000"/>
                   </a:solidFill>
@@ -3716,7 +3716,7 @@
             </a:ln>
             <a:extLst>
               <a:ext uri="{91240B29-F687-4f45-9708-019B960494DF}">
-                <a14:hiddenLine xmlns="" xmlns:a14="http://schemas.microsoft.com/office/drawing/2010/main" w="9525">
+                <a14:hiddenLine xmlns:a14="http://schemas.microsoft.com/office/drawing/2010/main" xmlns="" w="9525">
                   <a:solidFill>
                     <a:srgbClr val="000000"/>
                   </a:solidFill>
@@ -3806,7 +3806,7 @@
             </a:ln>
             <a:extLst>
               <a:ext uri="{91240B29-F687-4f45-9708-019B960494DF}">
-                <a14:hiddenLine xmlns="" xmlns:a14="http://schemas.microsoft.com/office/drawing/2010/main" w="9525">
+                <a14:hiddenLine xmlns:a14="http://schemas.microsoft.com/office/drawing/2010/main" xmlns="" w="9525">
                   <a:solidFill>
                     <a:srgbClr val="000000"/>
                   </a:solidFill>
@@ -3868,7 +3868,7 @@
             </a:ln>
             <a:extLst>
               <a:ext uri="{91240B29-F687-4f45-9708-019B960494DF}">
-                <a14:hiddenLine xmlns="" xmlns:a14="http://schemas.microsoft.com/office/drawing/2010/main" w="9525">
+                <a14:hiddenLine xmlns:a14="http://schemas.microsoft.com/office/drawing/2010/main" xmlns="" w="9525">
                   <a:solidFill>
                     <a:srgbClr val="000000"/>
                   </a:solidFill>
@@ -3958,7 +3958,7 @@
             </a:ln>
             <a:extLst>
               <a:ext uri="{91240B29-F687-4f45-9708-019B960494DF}">
-                <a14:hiddenLine xmlns="" xmlns:a14="http://schemas.microsoft.com/office/drawing/2010/main" w="9525">
+                <a14:hiddenLine xmlns:a14="http://schemas.microsoft.com/office/drawing/2010/main" xmlns="" w="9525">
                   <a:solidFill>
                     <a:srgbClr val="000000"/>
                   </a:solidFill>
@@ -4048,7 +4048,7 @@
             </a:ln>
             <a:extLst>
               <a:ext uri="{91240B29-F687-4f45-9708-019B960494DF}">
-                <a14:hiddenLine xmlns="" xmlns:a14="http://schemas.microsoft.com/office/drawing/2010/main" w="9525">
+                <a14:hiddenLine xmlns:a14="http://schemas.microsoft.com/office/drawing/2010/main" xmlns="" w="9525">
                   <a:solidFill>
                     <a:srgbClr val="000000"/>
                   </a:solidFill>
@@ -4113,7 +4113,7 @@
             </a:ln>
             <a:extLst>
               <a:ext uri="{91240B29-F687-4f45-9708-019B960494DF}">
-                <a14:hiddenLine xmlns="" xmlns:a14="http://schemas.microsoft.com/office/drawing/2010/main" w="9525">
+                <a14:hiddenLine xmlns:a14="http://schemas.microsoft.com/office/drawing/2010/main" xmlns="" w="9525">
                   <a:solidFill>
                     <a:srgbClr val="000000"/>
                   </a:solidFill>
@@ -4175,7 +4175,7 @@
             </a:ln>
             <a:extLst>
               <a:ext uri="{91240B29-F687-4f45-9708-019B960494DF}">
-                <a14:hiddenLine xmlns="" xmlns:a14="http://schemas.microsoft.com/office/drawing/2010/main" w="9525">
+                <a14:hiddenLine xmlns:a14="http://schemas.microsoft.com/office/drawing/2010/main" xmlns="" w="9525">
                   <a:solidFill>
                     <a:srgbClr val="000000"/>
                   </a:solidFill>
@@ -4265,7 +4265,7 @@
             </a:ln>
             <a:extLst>
               <a:ext uri="{91240B29-F687-4f45-9708-019B960494DF}">
-                <a14:hiddenLine xmlns="" xmlns:a14="http://schemas.microsoft.com/office/drawing/2010/main" w="9525">
+                <a14:hiddenLine xmlns:a14="http://schemas.microsoft.com/office/drawing/2010/main" xmlns="" w="9525">
                   <a:solidFill>
                     <a:srgbClr val="000000"/>
                   </a:solidFill>
@@ -4355,7 +4355,7 @@
             </a:ln>
             <a:extLst>
               <a:ext uri="{91240B29-F687-4f45-9708-019B960494DF}">
-                <a14:hiddenLine xmlns="" xmlns:a14="http://schemas.microsoft.com/office/drawing/2010/main" w="9525">
+                <a14:hiddenLine xmlns:a14="http://schemas.microsoft.com/office/drawing/2010/main" xmlns="" w="9525">
                   <a:solidFill>
                     <a:srgbClr val="000000"/>
                   </a:solidFill>
@@ -4417,7 +4417,7 @@
             </a:ln>
             <a:extLst>
               <a:ext uri="{91240B29-F687-4f45-9708-019B960494DF}">
-                <a14:hiddenLine xmlns="" xmlns:a14="http://schemas.microsoft.com/office/drawing/2010/main" w="9525">
+                <a14:hiddenLine xmlns:a14="http://schemas.microsoft.com/office/drawing/2010/main" xmlns="" w="9525">
                   <a:solidFill>
                     <a:srgbClr val="000000"/>
                   </a:solidFill>
@@ -4537,7 +4537,7 @@
             </a:ln>
             <a:extLst>
               <a:ext uri="{91240B29-F687-4f45-9708-019B960494DF}">
-                <a14:hiddenLine xmlns="" xmlns:a14="http://schemas.microsoft.com/office/drawing/2010/main" w="9525">
+                <a14:hiddenLine xmlns:a14="http://schemas.microsoft.com/office/drawing/2010/main" xmlns="" w="9525">
                   <a:solidFill>
                     <a:srgbClr val="000000"/>
                   </a:solidFill>
@@ -4605,7 +4605,7 @@
             </a:ln>
             <a:extLst>
               <a:ext uri="{91240B29-F687-4f45-9708-019B960494DF}">
-                <a14:hiddenLine xmlns="" xmlns:a14="http://schemas.microsoft.com/office/drawing/2010/main" w="9525">
+                <a14:hiddenLine xmlns:a14="http://schemas.microsoft.com/office/drawing/2010/main" xmlns="" w="9525">
                   <a:solidFill>
                     <a:srgbClr val="000000"/>
                   </a:solidFill>
@@ -4695,7 +4695,7 @@
             </a:ln>
             <a:extLst>
               <a:ext uri="{91240B29-F687-4f45-9708-019B960494DF}">
-                <a14:hiddenLine xmlns="" xmlns:a14="http://schemas.microsoft.com/office/drawing/2010/main" w="9525">
+                <a14:hiddenLine xmlns:a14="http://schemas.microsoft.com/office/drawing/2010/main" xmlns="" w="9525">
                   <a:solidFill>
                     <a:srgbClr val="000000"/>
                   </a:solidFill>
@@ -4835,7 +4835,7 @@
           <a:p>
             <a:fld id="{5A742DFE-CDA7-4DC5-8F3B-2DEAF6F9EA33}" type="datetimeFigureOut">
               <a:rPr lang="en-CA" smtClean="0"/>
-              <a:t>07/03/2018</a:t>
+              <a:t>2018-03-08</a:t>
             </a:fld>
             <a:endParaRPr lang="en-CA"/>
           </a:p>
@@ -5102,7 +5102,7 @@
           <a:p>
             <a:fld id="{5A742DFE-CDA7-4DC5-8F3B-2DEAF6F9EA33}" type="datetimeFigureOut">
               <a:rPr lang="en-CA" smtClean="0"/>
-              <a:t>07/03/2018</a:t>
+              <a:t>2018-03-08</a:t>
             </a:fld>
             <a:endParaRPr lang="en-CA"/>
           </a:p>
@@ -5298,7 +5298,7 @@
           <a:p>
             <a:fld id="{5A742DFE-CDA7-4DC5-8F3B-2DEAF6F9EA33}" type="datetimeFigureOut">
               <a:rPr lang="en-CA" smtClean="0"/>
-              <a:t>07/03/2018</a:t>
+              <a:t>2018-03-08</a:t>
             </a:fld>
             <a:endParaRPr lang="en-CA"/>
           </a:p>
@@ -5561,7 +5561,7 @@
           <a:p>
             <a:fld id="{5A742DFE-CDA7-4DC5-8F3B-2DEAF6F9EA33}" type="datetimeFigureOut">
               <a:rPr lang="en-CA" smtClean="0"/>
-              <a:t>07/03/2018</a:t>
+              <a:t>2018-03-08</a:t>
             </a:fld>
             <a:endParaRPr lang="en-CA"/>
           </a:p>
@@ -5995,7 +5995,7 @@
           <a:p>
             <a:fld id="{5A742DFE-CDA7-4DC5-8F3B-2DEAF6F9EA33}" type="datetimeFigureOut">
               <a:rPr lang="en-CA" smtClean="0"/>
-              <a:t>07/03/2018</a:t>
+              <a:t>2018-03-08</a:t>
             </a:fld>
             <a:endParaRPr lang="en-CA"/>
           </a:p>
@@ -6541,7 +6541,7 @@
           <a:p>
             <a:fld id="{5A742DFE-CDA7-4DC5-8F3B-2DEAF6F9EA33}" type="datetimeFigureOut">
               <a:rPr lang="en-CA" smtClean="0"/>
-              <a:t>07/03/2018</a:t>
+              <a:t>2018-03-08</a:t>
             </a:fld>
             <a:endParaRPr lang="en-CA"/>
           </a:p>
@@ -7261,7 +7261,7 @@
           <a:p>
             <a:fld id="{5A742DFE-CDA7-4DC5-8F3B-2DEAF6F9EA33}" type="datetimeFigureOut">
               <a:rPr lang="en-CA" smtClean="0"/>
-              <a:t>07/03/2018</a:t>
+              <a:t>2018-03-08</a:t>
             </a:fld>
             <a:endParaRPr lang="en-CA"/>
           </a:p>
@@ -7431,7 +7431,7 @@
           <a:p>
             <a:fld id="{5A742DFE-CDA7-4DC5-8F3B-2DEAF6F9EA33}" type="datetimeFigureOut">
               <a:rPr lang="en-CA" smtClean="0"/>
-              <a:t>07/03/2018</a:t>
+              <a:t>2018-03-08</a:t>
             </a:fld>
             <a:endParaRPr lang="en-CA"/>
           </a:p>
@@ -7611,7 +7611,7 @@
           <a:p>
             <a:fld id="{5A742DFE-CDA7-4DC5-8F3B-2DEAF6F9EA33}" type="datetimeFigureOut">
               <a:rPr lang="en-CA" smtClean="0"/>
-              <a:t>07/03/2018</a:t>
+              <a:t>2018-03-08</a:t>
             </a:fld>
             <a:endParaRPr lang="en-CA"/>
           </a:p>
@@ -7781,7 +7781,7 @@
           <a:p>
             <a:fld id="{5A742DFE-CDA7-4DC5-8F3B-2DEAF6F9EA33}" type="datetimeFigureOut">
               <a:rPr lang="en-CA" smtClean="0"/>
-              <a:t>07/03/2018</a:t>
+              <a:t>2018-03-08</a:t>
             </a:fld>
             <a:endParaRPr lang="en-CA"/>
           </a:p>
@@ -8031,7 +8031,7 @@
           <a:p>
             <a:fld id="{5A742DFE-CDA7-4DC5-8F3B-2DEAF6F9EA33}" type="datetimeFigureOut">
               <a:rPr lang="en-CA" smtClean="0"/>
-              <a:t>07/03/2018</a:t>
+              <a:t>2018-03-08</a:t>
             </a:fld>
             <a:endParaRPr lang="en-CA"/>
           </a:p>
@@ -8263,7 +8263,7 @@
           <a:p>
             <a:fld id="{5A742DFE-CDA7-4DC5-8F3B-2DEAF6F9EA33}" type="datetimeFigureOut">
               <a:rPr lang="en-CA" smtClean="0"/>
-              <a:t>07/03/2018</a:t>
+              <a:t>2018-03-08</a:t>
             </a:fld>
             <a:endParaRPr lang="en-CA"/>
           </a:p>
@@ -8644,7 +8644,7 @@
           <a:p>
             <a:fld id="{5A742DFE-CDA7-4DC5-8F3B-2DEAF6F9EA33}" type="datetimeFigureOut">
               <a:rPr lang="en-CA" smtClean="0"/>
-              <a:t>07/03/2018</a:t>
+              <a:t>2018-03-08</a:t>
             </a:fld>
             <a:endParaRPr lang="en-CA"/>
           </a:p>
@@ -8762,7 +8762,7 @@
           <a:p>
             <a:fld id="{5A742DFE-CDA7-4DC5-8F3B-2DEAF6F9EA33}" type="datetimeFigureOut">
               <a:rPr lang="en-CA" smtClean="0"/>
-              <a:t>07/03/2018</a:t>
+              <a:t>2018-03-08</a:t>
             </a:fld>
             <a:endParaRPr lang="en-CA"/>
           </a:p>
@@ -8857,7 +8857,7 @@
           <a:p>
             <a:fld id="{5A742DFE-CDA7-4DC5-8F3B-2DEAF6F9EA33}" type="datetimeFigureOut">
               <a:rPr lang="en-CA" smtClean="0"/>
-              <a:t>07/03/2018</a:t>
+              <a:t>2018-03-08</a:t>
             </a:fld>
             <a:endParaRPr lang="en-CA"/>
           </a:p>
@@ -9106,7 +9106,7 @@
           <a:p>
             <a:fld id="{5A742DFE-CDA7-4DC5-8F3B-2DEAF6F9EA33}" type="datetimeFigureOut">
               <a:rPr lang="en-CA" smtClean="0"/>
-              <a:t>07/03/2018</a:t>
+              <a:t>2018-03-08</a:t>
             </a:fld>
             <a:endParaRPr lang="en-CA"/>
           </a:p>
@@ -9386,7 +9386,7 @@
           <a:p>
             <a:fld id="{5A742DFE-CDA7-4DC5-8F3B-2DEAF6F9EA33}" type="datetimeFigureOut">
               <a:rPr lang="en-CA" smtClean="0"/>
-              <a:t>07/03/2018</a:t>
+              <a:t>2018-03-08</a:t>
             </a:fld>
             <a:endParaRPr lang="en-CA"/>
           </a:p>
@@ -9502,7 +9502,7 @@
           <a:noFill/>
           <a:extLst>
             <a:ext uri="{909E8E84-426E-40dd-AFC4-6F175D3DCCD1}">
-              <a14:hiddenFill xmlns="" xmlns:a14="http://schemas.microsoft.com/office/drawing/2010/main">
+              <a14:hiddenFill xmlns:a14="http://schemas.microsoft.com/office/drawing/2010/main" xmlns="">
                 <a:solidFill>
                   <a:srgbClr val="FFFFFF"/>
                 </a:solidFill>
@@ -9576,7 +9576,7 @@
               </a:ln>
               <a:extLst>
                 <a:ext uri="{91240B29-F687-4f45-9708-019B960494DF}">
-                  <a14:hiddenLine xmlns="" xmlns:a14="http://schemas.microsoft.com/office/drawing/2010/main" w="9525">
+                  <a14:hiddenLine xmlns:a14="http://schemas.microsoft.com/office/drawing/2010/main" xmlns="" w="9525">
                     <a:solidFill>
                       <a:srgbClr val="000000"/>
                     </a:solidFill>
@@ -9666,7 +9666,7 @@
               </a:ln>
               <a:extLst>
                 <a:ext uri="{91240B29-F687-4f45-9708-019B960494DF}">
-                  <a14:hiddenLine xmlns="" xmlns:a14="http://schemas.microsoft.com/office/drawing/2010/main" w="9525">
+                  <a14:hiddenLine xmlns:a14="http://schemas.microsoft.com/office/drawing/2010/main" xmlns="" w="9525">
                     <a:solidFill>
                       <a:srgbClr val="000000"/>
                     </a:solidFill>
@@ -9756,7 +9756,7 @@
               </a:ln>
               <a:extLst>
                 <a:ext uri="{91240B29-F687-4f45-9708-019B960494DF}">
-                  <a14:hiddenLine xmlns="" xmlns:a14="http://schemas.microsoft.com/office/drawing/2010/main" w="9525">
+                  <a14:hiddenLine xmlns:a14="http://schemas.microsoft.com/office/drawing/2010/main" xmlns="" w="9525">
                     <a:solidFill>
                       <a:srgbClr val="000000"/>
                     </a:solidFill>
@@ -9818,7 +9818,7 @@
               </a:ln>
               <a:extLst>
                 <a:ext uri="{91240B29-F687-4f45-9708-019B960494DF}">
-                  <a14:hiddenLine xmlns="" xmlns:a14="http://schemas.microsoft.com/office/drawing/2010/main" w="9525">
+                  <a14:hiddenLine xmlns:a14="http://schemas.microsoft.com/office/drawing/2010/main" xmlns="" w="9525">
                     <a:solidFill>
                       <a:srgbClr val="000000"/>
                     </a:solidFill>
@@ -9908,7 +9908,7 @@
               </a:ln>
               <a:extLst>
                 <a:ext uri="{91240B29-F687-4f45-9708-019B960494DF}">
-                  <a14:hiddenLine xmlns="" xmlns:a14="http://schemas.microsoft.com/office/drawing/2010/main" w="9525">
+                  <a14:hiddenLine xmlns:a14="http://schemas.microsoft.com/office/drawing/2010/main" xmlns="" w="9525">
                     <a:solidFill>
                       <a:srgbClr val="000000"/>
                     </a:solidFill>
@@ -9970,7 +9970,7 @@
               </a:ln>
               <a:extLst>
                 <a:ext uri="{91240B29-F687-4f45-9708-019B960494DF}">
-                  <a14:hiddenLine xmlns="" xmlns:a14="http://schemas.microsoft.com/office/drawing/2010/main" w="9525">
+                  <a14:hiddenLine xmlns:a14="http://schemas.microsoft.com/office/drawing/2010/main" xmlns="" w="9525">
                     <a:solidFill>
                       <a:srgbClr val="000000"/>
                     </a:solidFill>
@@ -10032,7 +10032,7 @@
               </a:ln>
               <a:extLst>
                 <a:ext uri="{91240B29-F687-4f45-9708-019B960494DF}">
-                  <a14:hiddenLine xmlns="" xmlns:a14="http://schemas.microsoft.com/office/drawing/2010/main" w="9525">
+                  <a14:hiddenLine xmlns:a14="http://schemas.microsoft.com/office/drawing/2010/main" xmlns="" w="9525">
                     <a:solidFill>
                       <a:srgbClr val="000000"/>
                     </a:solidFill>
@@ -10122,7 +10122,7 @@
               </a:ln>
               <a:extLst>
                 <a:ext uri="{91240B29-F687-4f45-9708-019B960494DF}">
-                  <a14:hiddenLine xmlns="" xmlns:a14="http://schemas.microsoft.com/office/drawing/2010/main" w="9525">
+                  <a14:hiddenLine xmlns:a14="http://schemas.microsoft.com/office/drawing/2010/main" xmlns="" w="9525">
                     <a:solidFill>
                       <a:srgbClr val="000000"/>
                     </a:solidFill>
@@ -10212,7 +10212,7 @@
               </a:ln>
               <a:extLst>
                 <a:ext uri="{91240B29-F687-4f45-9708-019B960494DF}">
-                  <a14:hiddenLine xmlns="" xmlns:a14="http://schemas.microsoft.com/office/drawing/2010/main" w="9525">
+                  <a14:hiddenLine xmlns:a14="http://schemas.microsoft.com/office/drawing/2010/main" xmlns="" w="9525">
                     <a:solidFill>
                       <a:srgbClr val="000000"/>
                     </a:solidFill>
@@ -10274,7 +10274,7 @@
               </a:ln>
               <a:extLst>
                 <a:ext uri="{91240B29-F687-4f45-9708-019B960494DF}">
-                  <a14:hiddenLine xmlns="" xmlns:a14="http://schemas.microsoft.com/office/drawing/2010/main" w="9525">
+                  <a14:hiddenLine xmlns:a14="http://schemas.microsoft.com/office/drawing/2010/main" xmlns="" w="9525">
                     <a:solidFill>
                       <a:srgbClr val="000000"/>
                     </a:solidFill>
@@ -10384,7 +10384,7 @@
               </a:ln>
               <a:extLst>
                 <a:ext uri="{91240B29-F687-4f45-9708-019B960494DF}">
-                  <a14:hiddenLine xmlns="" xmlns:a14="http://schemas.microsoft.com/office/drawing/2010/main" w="9525">
+                  <a14:hiddenLine xmlns:a14="http://schemas.microsoft.com/office/drawing/2010/main" xmlns="" w="9525">
                     <a:solidFill>
                       <a:srgbClr val="000000"/>
                     </a:solidFill>
@@ -10468,7 +10468,7 @@
               </a:ln>
               <a:extLst>
                 <a:ext uri="{91240B29-F687-4f45-9708-019B960494DF}">
-                  <a14:hiddenLine xmlns="" xmlns:a14="http://schemas.microsoft.com/office/drawing/2010/main" w="9525">
+                  <a14:hiddenLine xmlns:a14="http://schemas.microsoft.com/office/drawing/2010/main" xmlns="" w="9525">
                     <a:solidFill>
                       <a:srgbClr val="000000"/>
                     </a:solidFill>
@@ -10530,7 +10530,7 @@
               </a:ln>
               <a:extLst>
                 <a:ext uri="{91240B29-F687-4f45-9708-019B960494DF}">
-                  <a14:hiddenLine xmlns="" xmlns:a14="http://schemas.microsoft.com/office/drawing/2010/main" w="9525">
+                  <a14:hiddenLine xmlns:a14="http://schemas.microsoft.com/office/drawing/2010/main" xmlns="" w="9525">
                     <a:solidFill>
                       <a:srgbClr val="000000"/>
                     </a:solidFill>
@@ -10592,7 +10592,7 @@
               </a:ln>
               <a:extLst>
                 <a:ext uri="{91240B29-F687-4f45-9708-019B960494DF}">
-                  <a14:hiddenLine xmlns="" xmlns:a14="http://schemas.microsoft.com/office/drawing/2010/main" w="9525">
+                  <a14:hiddenLine xmlns:a14="http://schemas.microsoft.com/office/drawing/2010/main" xmlns="" w="9525">
                     <a:solidFill>
                       <a:srgbClr val="000000"/>
                     </a:solidFill>
@@ -10682,7 +10682,7 @@
               </a:ln>
               <a:extLst>
                 <a:ext uri="{91240B29-F687-4f45-9708-019B960494DF}">
-                  <a14:hiddenLine xmlns="" xmlns:a14="http://schemas.microsoft.com/office/drawing/2010/main" w="9525">
+                  <a14:hiddenLine xmlns:a14="http://schemas.microsoft.com/office/drawing/2010/main" xmlns="" w="9525">
                     <a:solidFill>
                       <a:srgbClr val="000000"/>
                     </a:solidFill>
@@ -10716,7 +10716,7 @@
               </a:ln>
               <a:extLst>
                 <a:ext uri="{91240B29-F687-4f45-9708-019B960494DF}">
-                  <a14:hiddenLine xmlns="" xmlns:a14="http://schemas.microsoft.com/office/drawing/2010/main" w="9525">
+                  <a14:hiddenLine xmlns:a14="http://schemas.microsoft.com/office/drawing/2010/main" xmlns="" w="9525">
                     <a:solidFill>
                       <a:srgbClr val="000000"/>
                     </a:solidFill>
@@ -10781,7 +10781,7 @@
               </a:ln>
               <a:extLst>
                 <a:ext uri="{91240B29-F687-4f45-9708-019B960494DF}">
-                  <a14:hiddenLine xmlns="" xmlns:a14="http://schemas.microsoft.com/office/drawing/2010/main" w="9525">
+                  <a14:hiddenLine xmlns:a14="http://schemas.microsoft.com/office/drawing/2010/main" xmlns="" w="9525">
                     <a:solidFill>
                       <a:srgbClr val="000000"/>
                     </a:solidFill>
@@ -10871,7 +10871,7 @@
               </a:ln>
               <a:extLst>
                 <a:ext uri="{91240B29-F687-4f45-9708-019B960494DF}">
-                  <a14:hiddenLine xmlns="" xmlns:a14="http://schemas.microsoft.com/office/drawing/2010/main" w="9525">
+                  <a14:hiddenLine xmlns:a14="http://schemas.microsoft.com/office/drawing/2010/main" xmlns="" w="9525">
                     <a:solidFill>
                       <a:srgbClr val="000000"/>
                     </a:solidFill>
@@ -10933,7 +10933,7 @@
               </a:ln>
               <a:extLst>
                 <a:ext uri="{91240B29-F687-4f45-9708-019B960494DF}">
-                  <a14:hiddenLine xmlns="" xmlns:a14="http://schemas.microsoft.com/office/drawing/2010/main" w="9525">
+                  <a14:hiddenLine xmlns:a14="http://schemas.microsoft.com/office/drawing/2010/main" xmlns="" w="9525">
                     <a:solidFill>
                       <a:srgbClr val="000000"/>
                     </a:solidFill>
@@ -11023,7 +11023,7 @@
               </a:ln>
               <a:extLst>
                 <a:ext uri="{91240B29-F687-4f45-9708-019B960494DF}">
-                  <a14:hiddenLine xmlns="" xmlns:a14="http://schemas.microsoft.com/office/drawing/2010/main" w="9525">
+                  <a14:hiddenLine xmlns:a14="http://schemas.microsoft.com/office/drawing/2010/main" xmlns="" w="9525">
                     <a:solidFill>
                       <a:srgbClr val="000000"/>
                     </a:solidFill>
@@ -11088,7 +11088,7 @@
               </a:ln>
               <a:extLst>
                 <a:ext uri="{91240B29-F687-4f45-9708-019B960494DF}">
-                  <a14:hiddenLine xmlns="" xmlns:a14="http://schemas.microsoft.com/office/drawing/2010/main" w="9525">
+                  <a14:hiddenLine xmlns:a14="http://schemas.microsoft.com/office/drawing/2010/main" xmlns="" w="9525">
                     <a:solidFill>
                       <a:srgbClr val="000000"/>
                     </a:solidFill>
@@ -11150,7 +11150,7 @@
               </a:ln>
               <a:extLst>
                 <a:ext uri="{91240B29-F687-4f45-9708-019B960494DF}">
-                  <a14:hiddenLine xmlns="" xmlns:a14="http://schemas.microsoft.com/office/drawing/2010/main" w="9525">
+                  <a14:hiddenLine xmlns:a14="http://schemas.microsoft.com/office/drawing/2010/main" xmlns="" w="9525">
                     <a:solidFill>
                       <a:srgbClr val="000000"/>
                     </a:solidFill>
@@ -11240,7 +11240,7 @@
               </a:ln>
               <a:extLst>
                 <a:ext uri="{91240B29-F687-4f45-9708-019B960494DF}">
-                  <a14:hiddenLine xmlns="" xmlns:a14="http://schemas.microsoft.com/office/drawing/2010/main" w="9525">
+                  <a14:hiddenLine xmlns:a14="http://schemas.microsoft.com/office/drawing/2010/main" xmlns="" w="9525">
                     <a:solidFill>
                       <a:srgbClr val="000000"/>
                     </a:solidFill>
@@ -11330,7 +11330,7 @@
               </a:ln>
               <a:extLst>
                 <a:ext uri="{91240B29-F687-4f45-9708-019B960494DF}">
-                  <a14:hiddenLine xmlns="" xmlns:a14="http://schemas.microsoft.com/office/drawing/2010/main" w="9525">
+                  <a14:hiddenLine xmlns:a14="http://schemas.microsoft.com/office/drawing/2010/main" xmlns="" w="9525">
                     <a:solidFill>
                       <a:srgbClr val="000000"/>
                     </a:solidFill>
@@ -11395,7 +11395,7 @@
               </a:ln>
               <a:extLst>
                 <a:ext uri="{91240B29-F687-4f45-9708-019B960494DF}">
-                  <a14:hiddenLine xmlns="" xmlns:a14="http://schemas.microsoft.com/office/drawing/2010/main" w="9525">
+                  <a14:hiddenLine xmlns:a14="http://schemas.microsoft.com/office/drawing/2010/main" xmlns="" w="9525">
                     <a:solidFill>
                       <a:srgbClr val="000000"/>
                     </a:solidFill>
@@ -11515,7 +11515,7 @@
               </a:ln>
               <a:extLst>
                 <a:ext uri="{91240B29-F687-4f45-9708-019B960494DF}">
-                  <a14:hiddenLine xmlns="" xmlns:a14="http://schemas.microsoft.com/office/drawing/2010/main" w="9525">
+                  <a14:hiddenLine xmlns:a14="http://schemas.microsoft.com/office/drawing/2010/main" xmlns="" w="9525">
                     <a:solidFill>
                       <a:srgbClr val="000000"/>
                     </a:solidFill>
@@ -11613,7 +11613,7 @@
               </a:ln>
               <a:extLst>
                 <a:ext uri="{91240B29-F687-4f45-9708-019B960494DF}">
-                  <a14:hiddenLine xmlns="" xmlns:a14="http://schemas.microsoft.com/office/drawing/2010/main" w="9525">
+                  <a14:hiddenLine xmlns:a14="http://schemas.microsoft.com/office/drawing/2010/main" xmlns="" w="9525">
                     <a:solidFill>
                       <a:srgbClr val="000000"/>
                     </a:solidFill>
@@ -11728,7 +11728,7 @@
               </a:ln>
               <a:extLst>
                 <a:ext uri="{91240B29-F687-4f45-9708-019B960494DF}">
-                  <a14:hiddenLine xmlns="" xmlns:a14="http://schemas.microsoft.com/office/drawing/2010/main" w="9525">
+                  <a14:hiddenLine xmlns:a14="http://schemas.microsoft.com/office/drawing/2010/main" xmlns="" w="9525">
                     <a:solidFill>
                       <a:srgbClr val="000000"/>
                     </a:solidFill>
@@ -11818,7 +11818,7 @@
               </a:ln>
               <a:extLst>
                 <a:ext uri="{91240B29-F687-4f45-9708-019B960494DF}">
-                  <a14:hiddenLine xmlns="" xmlns:a14="http://schemas.microsoft.com/office/drawing/2010/main" w="9525">
+                  <a14:hiddenLine xmlns:a14="http://schemas.microsoft.com/office/drawing/2010/main" xmlns="" w="9525">
                     <a:solidFill>
                       <a:srgbClr val="000000"/>
                     </a:solidFill>
@@ -11883,7 +11883,7 @@
               </a:ln>
               <a:extLst>
                 <a:ext uri="{91240B29-F687-4f45-9708-019B960494DF}">
-                  <a14:hiddenLine xmlns="" xmlns:a14="http://schemas.microsoft.com/office/drawing/2010/main" w="9525">
+                  <a14:hiddenLine xmlns:a14="http://schemas.microsoft.com/office/drawing/2010/main" xmlns="" w="9525">
                     <a:solidFill>
                       <a:srgbClr val="000000"/>
                     </a:solidFill>
@@ -11973,7 +11973,7 @@
               </a:ln>
               <a:extLst>
                 <a:ext uri="{91240B29-F687-4f45-9708-019B960494DF}">
-                  <a14:hiddenLine xmlns="" xmlns:a14="http://schemas.microsoft.com/office/drawing/2010/main" w="9525">
+                  <a14:hiddenLine xmlns:a14="http://schemas.microsoft.com/office/drawing/2010/main" xmlns="" w="9525">
                     <a:solidFill>
                       <a:srgbClr val="000000"/>
                     </a:solidFill>
@@ -12041,7 +12041,7 @@
               </a:ln>
               <a:extLst>
                 <a:ext uri="{91240B29-F687-4f45-9708-019B960494DF}">
-                  <a14:hiddenLine xmlns="" xmlns:a14="http://schemas.microsoft.com/office/drawing/2010/main" w="9525">
+                  <a14:hiddenLine xmlns:a14="http://schemas.microsoft.com/office/drawing/2010/main" xmlns="" w="9525">
                     <a:solidFill>
                       <a:srgbClr val="000000"/>
                     </a:solidFill>
@@ -12131,7 +12131,7 @@
               </a:ln>
               <a:extLst>
                 <a:ext uri="{91240B29-F687-4f45-9708-019B960494DF}">
-                  <a14:hiddenLine xmlns="" xmlns:a14="http://schemas.microsoft.com/office/drawing/2010/main" w="9525">
+                  <a14:hiddenLine xmlns:a14="http://schemas.microsoft.com/office/drawing/2010/main" xmlns="" w="9525">
                     <a:solidFill>
                       <a:srgbClr val="000000"/>
                     </a:solidFill>
@@ -12199,7 +12199,7 @@
               </a:ln>
               <a:extLst>
                 <a:ext uri="{91240B29-F687-4f45-9708-019B960494DF}">
-                  <a14:hiddenLine xmlns="" xmlns:a14="http://schemas.microsoft.com/office/drawing/2010/main" w="9525">
+                  <a14:hiddenLine xmlns:a14="http://schemas.microsoft.com/office/drawing/2010/main" xmlns="" w="9525">
                     <a:solidFill>
                       <a:srgbClr val="000000"/>
                     </a:solidFill>
@@ -12289,7 +12289,7 @@
               </a:ln>
               <a:extLst>
                 <a:ext uri="{91240B29-F687-4f45-9708-019B960494DF}">
-                  <a14:hiddenLine xmlns="" xmlns:a14="http://schemas.microsoft.com/office/drawing/2010/main" w="9525">
+                  <a14:hiddenLine xmlns:a14="http://schemas.microsoft.com/office/drawing/2010/main" xmlns="" w="9525">
                     <a:solidFill>
                       <a:srgbClr val="000000"/>
                     </a:solidFill>
@@ -12323,7 +12323,7 @@
               </a:ln>
               <a:extLst>
                 <a:ext uri="{91240B29-F687-4f45-9708-019B960494DF}">
-                  <a14:hiddenLine xmlns="" xmlns:a14="http://schemas.microsoft.com/office/drawing/2010/main" w="9525">
+                  <a14:hiddenLine xmlns:a14="http://schemas.microsoft.com/office/drawing/2010/main" xmlns="" w="9525">
                     <a:solidFill>
                       <a:srgbClr val="000000"/>
                     </a:solidFill>
@@ -12463,7 +12463,7 @@
           <a:p>
             <a:fld id="{5A742DFE-CDA7-4DC5-8F3B-2DEAF6F9EA33}" type="datetimeFigureOut">
               <a:rPr lang="en-CA" smtClean="0"/>
-              <a:t>07/03/2018</a:t>
+              <a:t>2018-03-08</a:t>
             </a:fld>
             <a:endParaRPr lang="en-CA"/>
           </a:p>
@@ -12938,7 +12938,7 @@
         <p:spPr/>
         <p:txBody>
           <a:bodyPr>
-            <a:normAutofit/>
+            <a:normAutofit fontScale="77500" lnSpcReduction="20000"/>
           </a:bodyPr>
           <a:lstStyle/>
           <a:p>
@@ -12956,7 +12956,7 @@
           <a:p>
             <a:pPr algn="r"/>
             <a:r>
-              <a:rPr lang="en-CA" sz="2400" dirty="0"/>
+              <a:rPr lang="en-CA" sz="3600" dirty="0"/>
               <a:t>                    design by:  Anita Mirshahi  &amp;  Qian gao </a:t>
             </a:r>
           </a:p>
@@ -13041,35 +13041,37 @@
         <p:spPr/>
         <p:txBody>
           <a:bodyPr>
-            <a:normAutofit/>
+            <a:noAutofit/>
           </a:bodyPr>
           <a:lstStyle/>
           <a:p>
             <a:r>
-              <a:rPr lang="en-CA" sz="3600" dirty="0"/>
-              <a:t>Make levels for the game / Speed up</a:t>
+              <a:rPr lang="en-US" sz="3600" dirty="0"/>
+              <a:t>Replay last game</a:t>
             </a:r>
+          </a:p>
+          <a:p>
+            <a:r>
+              <a:rPr lang="en-US" sz="3600" dirty="0"/>
+              <a:t>Create BD more tables save data</a:t>
+            </a:r>
+            <a:endParaRPr lang="en-CA" sz="3600" dirty="0"/>
           </a:p>
           <a:p>
             <a:r>
               <a:rPr lang="en-CA" sz="3600" dirty="0"/>
-              <a:t>Live game / Play with two PCs</a:t>
+              <a:t>Create map  with water, ice and wall (or 3D)</a:t>
             </a:r>
           </a:p>
           <a:p>
+            <a:r>
+              <a:rPr lang="en-US" sz="3600" dirty="0"/>
+              <a:t>Networking game  C/</a:t>
+            </a:r>
             <a:r>
               <a:rPr lang="en-CA" sz="3600" dirty="0"/>
-              <a:t>User can change settings</a:t>
+              <a:t>S </a:t>
             </a:r>
-          </a:p>
-          <a:p>
-            <a:r>
-              <a:rPr lang="en-CA" sz="3600" dirty="0"/>
-              <a:t>Create map</a:t>
-            </a:r>
-          </a:p>
-          <a:p>
-            <a:endParaRPr lang="en-CA" sz="3600" dirty="0"/>
           </a:p>
         </p:txBody>
       </p:sp>
@@ -13128,7 +13130,7 @@
           <a:p>
             <a:r>
               <a:rPr lang="en-CA" sz="4800" dirty="0"/>
-              <a:t>Summary:</a:t>
+              <a:t>Conclusion:</a:t>
             </a:r>
           </a:p>
         </p:txBody>
@@ -13152,41 +13154,38 @@
         <p:spPr/>
         <p:txBody>
           <a:bodyPr>
-            <a:normAutofit fontScale="92500" lnSpcReduction="10000"/>
+            <a:normAutofit/>
           </a:bodyPr>
           <a:lstStyle/>
           <a:p>
+            <a:pPr marL="0" indent="0">
+              <a:buNone/>
+            </a:pPr>
+            <a:endParaRPr lang="en-US" dirty="0"/>
+          </a:p>
+          <a:p>
+            <a:pPr marL="0" indent="0">
+              <a:buNone/>
+            </a:pPr>
             <a:r>
-              <a:rPr lang="en-CA" sz="3600" dirty="0"/>
-              <a:t>Draw tanks</a:t>
+              <a:rPr lang="en-US" sz="4800" dirty="0"/>
+              <a:t>“G</a:t>
             </a:r>
-          </a:p>
-          <a:p>
             <a:r>
-              <a:rPr lang="en-CA" sz="3600" dirty="0"/>
-              <a:t>Move tanks</a:t>
+              <a:rPr lang="en-CA" sz="4800" dirty="0"/>
+              <a:t>reat question. Any other questions</a:t>
             </a:r>
-          </a:p>
-          <a:p>
             <a:r>
-              <a:rPr lang="en-CA" sz="3600" dirty="0"/>
-              <a:t>Collision</a:t>
+              <a:rPr lang="en-CA" sz="4800" dirty="0">
+                <a:latin typeface="Arial" panose="020B0604020202020204" pitchFamily="34" charset="0"/>
+                <a:cs typeface="Arial" panose="020B0604020202020204" pitchFamily="34" charset="0"/>
+              </a:rPr>
+              <a:t> ?</a:t>
             </a:r>
-          </a:p>
-          <a:p>
             <a:r>
-              <a:rPr lang="en-CA" sz="3600" dirty="0"/>
-              <a:t>Shooting bullets</a:t>
+              <a:rPr lang="en-CA" sz="4800" dirty="0"/>
+              <a:t>”</a:t>
             </a:r>
-          </a:p>
-          <a:p>
-            <a:r>
-              <a:rPr lang="en-CA" sz="3600" dirty="0"/>
-              <a:t>Explosion</a:t>
-            </a:r>
-          </a:p>
-          <a:p>
-            <a:endParaRPr lang="en-CA" dirty="0"/>
           </a:p>
         </p:txBody>
       </p:sp>
@@ -13288,7 +13287,7 @@
             </a:pPr>
             <a:r>
               <a:rPr lang="en-US" sz="3600" dirty="0"/>
-              <a:t>This is a 2D game designed for all gender and age groups. </a:t>
+              <a:t>     This is a 2D game designed for all gender and age groups. </a:t>
             </a:r>
           </a:p>
           <a:p>
@@ -13297,7 +13296,7 @@
             </a:pPr>
             <a:r>
               <a:rPr lang="en-US" sz="3600" dirty="0"/>
-              <a:t>Anyone who opted in will benefit the enjoy of playing an action game as well as improving the attention, mood, cognitive, strengths.</a:t>
+              <a:t>     Anyone who opted in will benefit the enjoy of playing an action game as well as improving the attention, mood, cognitive, strengths.</a:t>
             </a:r>
           </a:p>
           <a:p>
@@ -13402,6 +13401,44 @@
           </a:p>
         </p:txBody>
       </p:sp>
+      <p:pic>
+        <p:nvPicPr>
+          <p:cNvPr id="4" name="Tankwar">
+            <a:hlinkClick r:id="" action="ppaction://media"/>
+            <a:extLst>
+              <a:ext uri="{FF2B5EF4-FFF2-40B4-BE49-F238E27FC236}">
+                <a16:creationId xmlns:a16="http://schemas.microsoft.com/office/drawing/2014/main" id="{1DF0A2A2-2C0D-40D4-96FB-F8A7A990D21F}"/>
+              </a:ext>
+            </a:extLst>
+          </p:cNvPr>
+          <p:cNvPicPr>
+            <a:picLocks noChangeAspect="1"/>
+          </p:cNvPicPr>
+          <p:nvPr>
+            <a:videoFile r:link="rId2"/>
+            <p:extLst>
+              <p:ext uri="{DAA4B4D4-6D71-4841-9C94-3DE7FCFB9230}">
+                <p14:media xmlns:p14="http://schemas.microsoft.com/office/powerpoint/2010/main" r:embed="rId1"/>
+              </p:ext>
+            </p:extLst>
+          </p:nvPr>
+        </p:nvPicPr>
+        <p:blipFill>
+          <a:blip r:embed="rId4"/>
+          <a:stretch>
+            <a:fillRect/>
+          </a:stretch>
+        </p:blipFill>
+        <p:spPr>
+          <a:xfrm>
+            <a:off x="1354786" y="1735493"/>
+            <a:ext cx="8809037" cy="4407937"/>
+          </a:xfrm>
+          <a:prstGeom prst="rect">
+            <a:avLst/>
+          </a:prstGeom>
+        </p:spPr>
+      </p:pic>
     </p:spTree>
     <p:extLst>
       <p:ext uri="{BB962C8B-B14F-4D97-AF65-F5344CB8AC3E}">
@@ -13412,6 +13449,141 @@
   <p:clrMapOvr>
     <a:masterClrMapping/>
   </p:clrMapOvr>
+  <p:timing>
+    <p:tnLst>
+      <p:par>
+        <p:cTn id="1" dur="indefinite" restart="never" nodeType="tmRoot">
+          <p:childTnLst>
+            <p:seq concurrent="1" nextAc="seek">
+              <p:cTn id="2" dur="indefinite" nodeType="mainSeq">
+                <p:childTnLst>
+                  <p:par>
+                    <p:cTn id="3" fill="hold">
+                      <p:stCondLst>
+                        <p:cond delay="indefinite"/>
+                      </p:stCondLst>
+                      <p:childTnLst>
+                        <p:par>
+                          <p:cTn id="4" fill="hold">
+                            <p:stCondLst>
+                              <p:cond delay="0"/>
+                            </p:stCondLst>
+                            <p:childTnLst>
+                              <p:par>
+                                <p:cTn id="5" presetID="1" presetClass="mediacall" presetSubtype="0" fill="hold" nodeType="clickEffect">
+                                  <p:stCondLst>
+                                    <p:cond delay="0"/>
+                                  </p:stCondLst>
+                                  <p:childTnLst>
+                                    <p:cmd type="call" cmd="playFrom(0.0)">
+                                      <p:cBhvr>
+                                        <p:cTn id="6" dur="37400" fill="hold"/>
+                                        <p:tgtEl>
+                                          <p:spTgt spid="4"/>
+                                        </p:tgtEl>
+                                      </p:cBhvr>
+                                    </p:cmd>
+                                  </p:childTnLst>
+                                </p:cTn>
+                              </p:par>
+                            </p:childTnLst>
+                          </p:cTn>
+                        </p:par>
+                      </p:childTnLst>
+                    </p:cTn>
+                  </p:par>
+                </p:childTnLst>
+              </p:cTn>
+              <p:prevCondLst>
+                <p:cond evt="onPrev" delay="0">
+                  <p:tgtEl>
+                    <p:sldTgt/>
+                  </p:tgtEl>
+                </p:cond>
+              </p:prevCondLst>
+              <p:nextCondLst>
+                <p:cond evt="onNext" delay="0">
+                  <p:tgtEl>
+                    <p:sldTgt/>
+                  </p:tgtEl>
+                </p:cond>
+              </p:nextCondLst>
+            </p:seq>
+            <p:video>
+              <p:cMediaNode vol="80000" mute="1">
+                <p:cTn id="7" fill="hold" display="0">
+                  <p:stCondLst>
+                    <p:cond delay="indefinite"/>
+                  </p:stCondLst>
+                </p:cTn>
+                <p:tgtEl>
+                  <p:spTgt spid="4"/>
+                </p:tgtEl>
+              </p:cMediaNode>
+            </p:video>
+            <p:seq concurrent="1" nextAc="seek">
+              <p:cTn id="8" restart="whenNotActive" fill="hold" evtFilter="cancelBubble" nodeType="interactiveSeq">
+                <p:stCondLst>
+                  <p:cond evt="onClick" delay="0">
+                    <p:tgtEl>
+                      <p:spTgt spid="4"/>
+                    </p:tgtEl>
+                  </p:cond>
+                </p:stCondLst>
+                <p:endSync evt="end" delay="0">
+                  <p:rtn val="all"/>
+                </p:endSync>
+                <p:childTnLst>
+                  <p:par>
+                    <p:cTn id="9" fill="hold">
+                      <p:stCondLst>
+                        <p:cond delay="0"/>
+                      </p:stCondLst>
+                      <p:childTnLst>
+                        <p:par>
+                          <p:cTn id="10" fill="hold">
+                            <p:stCondLst>
+                              <p:cond delay="0"/>
+                            </p:stCondLst>
+                            <p:childTnLst>
+                              <p:par>
+                                <p:cTn id="11" presetID="2" presetClass="mediacall" presetSubtype="0" fill="hold" nodeType="clickEffect">
+                                  <p:stCondLst>
+                                    <p:cond delay="0"/>
+                                  </p:stCondLst>
+                                  <p:childTnLst>
+                                    <p:cmd type="call" cmd="togglePause">
+                                      <p:cBhvr>
+                                        <p:cTn id="12" dur="1" fill="hold"/>
+                                        <p:tgtEl>
+                                          <p:spTgt spid="4"/>
+                                        </p:tgtEl>
+                                      </p:cBhvr>
+                                    </p:cmd>
+                                  </p:childTnLst>
+                                </p:cTn>
+                              </p:par>
+                            </p:childTnLst>
+                          </p:cTn>
+                        </p:par>
+                      </p:childTnLst>
+                    </p:cTn>
+                  </p:par>
+                </p:childTnLst>
+              </p:cTn>
+              <p:nextCondLst>
+                <p:cond evt="onClick" delay="0">
+                  <p:tgtEl>
+                    <p:spTgt spid="4"/>
+                  </p:tgtEl>
+                </p:cond>
+              </p:nextCondLst>
+            </p:seq>
+          </p:childTnLst>
+        </p:cTn>
+      </p:par>
+    </p:tnLst>
+  </p:timing>
 </p:sld>
 </file>
 
@@ -13478,7 +13650,12 @@
             <p:ph idx="1"/>
           </p:nvPr>
         </p:nvSpPr>
-        <p:spPr/>
+        <p:spPr>
+          <a:xfrm>
+            <a:off x="1141412" y="1838131"/>
+            <a:ext cx="9905999" cy="3953070"/>
+          </a:xfrm>
+        </p:spPr>
         <p:txBody>
           <a:bodyPr>
             <a:normAutofit/>
@@ -13493,14 +13670,21 @@
           <a:p>
             <a:r>
               <a:rPr lang="en-CA" sz="3600" dirty="0"/>
+              <a:t>Collision detection</a:t>
+            </a:r>
+          </a:p>
+          <a:p>
+            <a:r>
+              <a:rPr lang="en-US" sz="3600" dirty="0"/>
+              <a:t>Save game</a:t>
+            </a:r>
+          </a:p>
+          <a:p>
+            <a:r>
+              <a:rPr lang="en-CA" sz="3600" dirty="0"/>
               <a:t>Shooting bullets</a:t>
             </a:r>
-          </a:p>
-          <a:p>
-            <a:r>
-              <a:rPr lang="en-CA" sz="3600" dirty="0"/>
-              <a:t>Collision detection</a:t>
-            </a:r>
+            <a:endParaRPr lang="en-US" sz="3600" dirty="0"/>
           </a:p>
           <a:p>
             <a:r>
@@ -13509,9 +13693,6 @@
             </a:r>
           </a:p>
           <a:p>
-            <a:pPr marL="0" indent="0">
-              <a:buNone/>
-            </a:pPr>
             <a:endParaRPr lang="en-CA" sz="3600" dirty="0"/>
           </a:p>
           <a:p>
@@ -13627,16 +13808,36 @@
           <a:p>
             <a:pPr lvl="1"/>
             <a:r>
+              <a:rPr lang="en-US" sz="3600" dirty="0"/>
+              <a:t>D</a:t>
+            </a:r>
+            <a:r>
+              <a:rPr lang="en-CA" sz="3600" dirty="0"/>
+              <a:t>atabase </a:t>
+            </a:r>
+            <a:r>
+              <a:rPr lang="en-US" sz="3600" dirty="0"/>
+              <a:t>using SQLite</a:t>
+            </a:r>
+            <a:endParaRPr lang="en-CA" sz="3600" dirty="0"/>
+          </a:p>
+          <a:p>
+            <a:pPr lvl="1"/>
+            <a:r>
               <a:rPr lang="en-CA" sz="3600" dirty="0"/>
               <a:t>Multiple Threading</a:t>
             </a:r>
           </a:p>
           <a:p>
-            <a:pPr lvl="1"/>
+            <a:pPr marL="457200" lvl="1" indent="0">
+              <a:buNone/>
+            </a:pPr>
             <a:endParaRPr lang="en-CA" sz="3600" dirty="0"/>
           </a:p>
           <a:p>
-            <a:pPr lvl="1"/>
+            <a:pPr marL="457200" lvl="1" indent="0">
+              <a:buNone/>
+            </a:pPr>
             <a:endParaRPr lang="en-CA" sz="3600" dirty="0"/>
           </a:p>
           <a:p>
@@ -13740,6 +13941,56 @@
           </a:xfrm>
         </p:spPr>
       </p:pic>
+      <p:sp>
+        <p:nvSpPr>
+          <p:cNvPr id="3" name="Oval 2">
+            <a:extLst>
+              <a:ext uri="{FF2B5EF4-FFF2-40B4-BE49-F238E27FC236}">
+                <a16:creationId xmlns:a16="http://schemas.microsoft.com/office/drawing/2014/main" id="{37228003-7B49-4A0B-A7C2-11DC0EC078D7}"/>
+              </a:ext>
+            </a:extLst>
+          </p:cNvPr>
+          <p:cNvSpPr/>
+          <p:nvPr/>
+        </p:nvSpPr>
+        <p:spPr>
+          <a:xfrm>
+            <a:off x="718458" y="821093"/>
+            <a:ext cx="1987420" cy="802433"/>
+          </a:xfrm>
+          <a:prstGeom prst="ellipse">
+            <a:avLst/>
+          </a:prstGeom>
+        </p:spPr>
+        <p:style>
+          <a:lnRef idx="2">
+            <a:schemeClr val="accent1">
+              <a:shade val="50000"/>
+            </a:schemeClr>
+          </a:lnRef>
+          <a:fillRef idx="1">
+            <a:schemeClr val="accent1"/>
+          </a:fillRef>
+          <a:effectRef idx="0">
+            <a:schemeClr val="accent1"/>
+          </a:effectRef>
+          <a:fontRef idx="minor">
+            <a:schemeClr val="lt1"/>
+          </a:fontRef>
+        </p:style>
+        <p:txBody>
+          <a:bodyPr rtlCol="0" anchor="ctr"/>
+          <a:lstStyle/>
+          <a:p>
+            <a:pPr algn="ctr"/>
+            <a:r>
+              <a:rPr lang="en-US" sz="3600" dirty="0"/>
+              <a:t>Code:</a:t>
+            </a:r>
+            <a:endParaRPr lang="en-CA" sz="3600" dirty="0"/>
+          </a:p>
+        </p:txBody>
+      </p:sp>
     </p:spTree>
     <p:extLst>
       <p:ext uri="{BB962C8B-B14F-4D97-AF65-F5344CB8AC3E}">
@@ -13754,6 +14005,146 @@
 </file>
 
 <file path=ppt/slides/slide7.xml><?xml version="1.0" encoding="utf-8"?>
+<p:sld xmlns:a="http://schemas.openxmlformats.org/drawingml/2006/main" xmlns:r="http://schemas.openxmlformats.org/officeDocument/2006/relationships" xmlns:p="http://schemas.openxmlformats.org/presentationml/2006/main">
+  <p:cSld>
+    <p:spTree>
+      <p:nvGrpSpPr>
+        <p:cNvPr id="1" name=""/>
+        <p:cNvGrpSpPr/>
+        <p:nvPr/>
+      </p:nvGrpSpPr>
+      <p:grpSpPr>
+        <a:xfrm>
+          <a:off x="0" y="0"/>
+          <a:ext cx="0" cy="0"/>
+          <a:chOff x="0" y="0"/>
+          <a:chExt cx="0" cy="0"/>
+        </a:xfrm>
+      </p:grpSpPr>
+      <p:sp>
+        <p:nvSpPr>
+          <p:cNvPr id="2" name="Title 1">
+            <a:extLst>
+              <a:ext uri="{FF2B5EF4-FFF2-40B4-BE49-F238E27FC236}">
+                <a16:creationId xmlns:a16="http://schemas.microsoft.com/office/drawing/2014/main" id="{6319A713-28FB-4E11-8DAB-87B0278D13BF}"/>
+              </a:ext>
+            </a:extLst>
+          </p:cNvPr>
+          <p:cNvSpPr>
+            <a:spLocks noGrp="1"/>
+          </p:cNvSpPr>
+          <p:nvPr>
+            <p:ph type="title"/>
+          </p:nvPr>
+        </p:nvSpPr>
+        <p:spPr>
+          <a:xfrm>
+            <a:off x="1141413" y="618518"/>
+            <a:ext cx="9905998" cy="1478570"/>
+          </a:xfrm>
+        </p:spPr>
+        <p:txBody>
+          <a:bodyPr>
+            <a:normAutofit/>
+          </a:bodyPr>
+          <a:lstStyle/>
+          <a:p>
+            <a:r>
+              <a:rPr lang="en-US" sz="4800" dirty="0"/>
+              <a:t>Thread Life Cycle in java</a:t>
+            </a:r>
+            <a:br>
+              <a:rPr lang="en-CA" sz="4800" dirty="0"/>
+            </a:br>
+            <a:endParaRPr lang="en-CA" sz="4800" dirty="0"/>
+          </a:p>
+        </p:txBody>
+      </p:sp>
+      <p:sp>
+        <p:nvSpPr>
+          <p:cNvPr id="3" name="Content Placeholder 2">
+            <a:extLst>
+              <a:ext uri="{FF2B5EF4-FFF2-40B4-BE49-F238E27FC236}">
+                <a16:creationId xmlns:a16="http://schemas.microsoft.com/office/drawing/2014/main" id="{E2063024-A6E2-4C5A-8DB0-F6AC85758155}"/>
+              </a:ext>
+            </a:extLst>
+          </p:cNvPr>
+          <p:cNvSpPr>
+            <a:spLocks noGrp="1"/>
+          </p:cNvSpPr>
+          <p:nvPr>
+            <p:ph idx="1"/>
+          </p:nvPr>
+        </p:nvSpPr>
+        <p:spPr>
+          <a:xfrm>
+            <a:off x="1141412" y="1716258"/>
+            <a:ext cx="9905999" cy="5008099"/>
+          </a:xfrm>
+        </p:spPr>
+        <p:txBody>
+          <a:bodyPr>
+            <a:normAutofit/>
+          </a:bodyPr>
+          <a:lstStyle/>
+          <a:p>
+            <a:endParaRPr lang="en-CA" sz="3600" dirty="0"/>
+          </a:p>
+          <a:p>
+            <a:endParaRPr lang="en-CA" sz="3600" dirty="0"/>
+          </a:p>
+        </p:txBody>
+      </p:sp>
+      <p:pic>
+        <p:nvPicPr>
+          <p:cNvPr id="5" name="Picture 4">
+            <a:extLst>
+              <a:ext uri="{FF2B5EF4-FFF2-40B4-BE49-F238E27FC236}">
+                <a16:creationId xmlns:a16="http://schemas.microsoft.com/office/drawing/2014/main" id="{572C4D87-B427-46EF-B2C7-4F84CE5586A1}"/>
+              </a:ext>
+            </a:extLst>
+          </p:cNvPr>
+          <p:cNvPicPr>
+            <a:picLocks noChangeAspect="1"/>
+          </p:cNvPicPr>
+          <p:nvPr/>
+        </p:nvPicPr>
+        <p:blipFill>
+          <a:blip r:embed="rId2">
+            <a:extLst>
+              <a:ext uri="{28A0092B-C50C-407E-A947-70E740481C1C}">
+                <a14:useLocalDpi xmlns:a14="http://schemas.microsoft.com/office/drawing/2010/main" val="0"/>
+              </a:ext>
+            </a:extLst>
+          </a:blip>
+          <a:stretch>
+            <a:fillRect/>
+          </a:stretch>
+        </p:blipFill>
+        <p:spPr>
+          <a:xfrm>
+            <a:off x="2006081" y="1558212"/>
+            <a:ext cx="7483151" cy="4226768"/>
+          </a:xfrm>
+          <a:prstGeom prst="rect">
+            <a:avLst/>
+          </a:prstGeom>
+        </p:spPr>
+      </p:pic>
+    </p:spTree>
+    <p:extLst>
+      <p:ext uri="{BB962C8B-B14F-4D97-AF65-F5344CB8AC3E}">
+        <p14:creationId xmlns:p14="http://schemas.microsoft.com/office/powerpoint/2010/main" val="2864139903"/>
+      </p:ext>
+    </p:extLst>
+  </p:cSld>
+  <p:clrMapOvr>
+    <a:masterClrMapping/>
+  </p:clrMapOvr>
+</p:sld>
+</file>
+
+<file path=ppt/slides/slide8.xml><?xml version="1.0" encoding="utf-8"?>
 <p:sld xmlns:a="http://schemas.openxmlformats.org/drawingml/2006/main" xmlns:r="http://schemas.openxmlformats.org/officeDocument/2006/relationships" xmlns:p="http://schemas.openxmlformats.org/presentationml/2006/main">
   <p:cSld>
     <p:spTree>
@@ -13852,7 +14243,7 @@
 </p:sld>
 </file>
 
-<file path=ppt/slides/slide8.xml><?xml version="1.0" encoding="utf-8"?>
+<file path=ppt/slides/slide9.xml><?xml version="1.0" encoding="utf-8"?>
 <p:sld xmlns:a="http://schemas.openxmlformats.org/drawingml/2006/main" xmlns:r="http://schemas.openxmlformats.org/officeDocument/2006/relationships" xmlns:p="http://schemas.openxmlformats.org/presentationml/2006/main">
   <p:cSld>
     <p:spTree>
@@ -13930,20 +14321,23 @@
           <a:p>
             <a:r>
               <a:rPr lang="en-CA" sz="3600" dirty="0"/>
-              <a:t>How to draw graphics</a:t>
+              <a:t>How to draw &amp; animate graphics</a:t>
             </a:r>
           </a:p>
           <a:p>
             <a:r>
               <a:rPr lang="en-CA" sz="3600" dirty="0"/>
-              <a:t>How to animate graphics</a:t>
+              <a:t>How to use keyboard to play game</a:t>
             </a:r>
           </a:p>
           <a:p>
             <a:r>
               <a:rPr lang="en-CA" sz="3600" dirty="0"/>
-              <a:t>How to use keyboard to control game</a:t>
+              <a:t>How to use database in game</a:t>
             </a:r>
+          </a:p>
+          <a:p>
+            <a:endParaRPr lang="en-CA" sz="3600" dirty="0"/>
           </a:p>
           <a:p>
             <a:endParaRPr lang="en-CA" sz="3600" dirty="0"/>
@@ -13963,151 +14357,6 @@
     <p:extLst>
       <p:ext uri="{BB962C8B-B14F-4D97-AF65-F5344CB8AC3E}">
         <p14:creationId xmlns:p14="http://schemas.microsoft.com/office/powerpoint/2010/main" val="1095436462"/>
-      </p:ext>
-    </p:extLst>
-  </p:cSld>
-  <p:clrMapOvr>
-    <a:masterClrMapping/>
-  </p:clrMapOvr>
-</p:sld>
-</file>
-
-<file path=ppt/slides/slide9.xml><?xml version="1.0" encoding="utf-8"?>
-<p:sld xmlns:a="http://schemas.openxmlformats.org/drawingml/2006/main" xmlns:r="http://schemas.openxmlformats.org/officeDocument/2006/relationships" xmlns:p="http://schemas.openxmlformats.org/presentationml/2006/main">
-  <p:cSld>
-    <p:spTree>
-      <p:nvGrpSpPr>
-        <p:cNvPr id="1" name=""/>
-        <p:cNvGrpSpPr/>
-        <p:nvPr/>
-      </p:nvGrpSpPr>
-      <p:grpSpPr>
-        <a:xfrm>
-          <a:off x="0" y="0"/>
-          <a:ext cx="0" cy="0"/>
-          <a:chOff x="0" y="0"/>
-          <a:chExt cx="0" cy="0"/>
-        </a:xfrm>
-      </p:grpSpPr>
-      <p:sp>
-        <p:nvSpPr>
-          <p:cNvPr id="2" name="Title 1">
-            <a:extLst>
-              <a:ext uri="{FF2B5EF4-FFF2-40B4-BE49-F238E27FC236}">
-                <a16:creationId xmlns:a16="http://schemas.microsoft.com/office/drawing/2014/main" id="{6319A713-28FB-4E11-8DAB-87B0278D13BF}"/>
-              </a:ext>
-            </a:extLst>
-          </p:cNvPr>
-          <p:cNvSpPr>
-            <a:spLocks noGrp="1"/>
-          </p:cNvSpPr>
-          <p:nvPr>
-            <p:ph type="title"/>
-          </p:nvPr>
-        </p:nvSpPr>
-        <p:spPr/>
-        <p:txBody>
-          <a:bodyPr>
-            <a:normAutofit/>
-          </a:bodyPr>
-          <a:lstStyle/>
-          <a:p>
-            <a:r>
-              <a:rPr lang="en-CA" sz="4800" dirty="0"/>
-              <a:t>To learn:</a:t>
-            </a:r>
-          </a:p>
-        </p:txBody>
-      </p:sp>
-      <p:sp>
-        <p:nvSpPr>
-          <p:cNvPr id="3" name="Content Placeholder 2">
-            <a:extLst>
-              <a:ext uri="{FF2B5EF4-FFF2-40B4-BE49-F238E27FC236}">
-                <a16:creationId xmlns:a16="http://schemas.microsoft.com/office/drawing/2014/main" id="{E2063024-A6E2-4C5A-8DB0-F6AC85758155}"/>
-              </a:ext>
-            </a:extLst>
-          </p:cNvPr>
-          <p:cNvSpPr>
-            <a:spLocks noGrp="1"/>
-          </p:cNvSpPr>
-          <p:nvPr>
-            <p:ph idx="1"/>
-          </p:nvPr>
-        </p:nvSpPr>
-        <p:spPr>
-          <a:xfrm>
-            <a:off x="1141412" y="1716258"/>
-            <a:ext cx="9905999" cy="5008099"/>
-          </a:xfrm>
-        </p:spPr>
-        <p:txBody>
-          <a:bodyPr>
-            <a:normAutofit/>
-          </a:bodyPr>
-          <a:lstStyle/>
-          <a:p>
-            <a:pPr marL="0" indent="0">
-              <a:buNone/>
-            </a:pPr>
-            <a:r>
-              <a:rPr lang="en-CA" sz="3600" dirty="0"/>
-              <a:t>Multithreading (</a:t>
-            </a:r>
-            <a:r>
-              <a:rPr lang="en-US" sz="3600" dirty="0"/>
-              <a:t>Life Cycle of a Thread):</a:t>
-            </a:r>
-            <a:endParaRPr lang="en-CA" sz="3600" dirty="0"/>
-          </a:p>
-          <a:p>
-            <a:endParaRPr lang="en-CA" sz="3600" dirty="0"/>
-          </a:p>
-          <a:p>
-            <a:endParaRPr lang="en-CA" sz="3600" dirty="0"/>
-          </a:p>
-        </p:txBody>
-      </p:sp>
-      <p:pic>
-        <p:nvPicPr>
-          <p:cNvPr id="9" name="Picture 8">
-            <a:extLst>
-              <a:ext uri="{FF2B5EF4-FFF2-40B4-BE49-F238E27FC236}">
-                <a16:creationId xmlns:a16="http://schemas.microsoft.com/office/drawing/2014/main" id="{2B4C62C7-FBE6-479C-992E-0F31A85C4D11}"/>
-              </a:ext>
-            </a:extLst>
-          </p:cNvPr>
-          <p:cNvPicPr>
-            <a:picLocks noChangeAspect="1"/>
-          </p:cNvPicPr>
-          <p:nvPr/>
-        </p:nvPicPr>
-        <p:blipFill>
-          <a:blip r:embed="rId2">
-            <a:extLst>
-              <a:ext uri="{28A0092B-C50C-407E-A947-70E740481C1C}">
-                <a14:useLocalDpi xmlns:a14="http://schemas.microsoft.com/office/drawing/2010/main" val="0"/>
-              </a:ext>
-            </a:extLst>
-          </a:blip>
-          <a:stretch>
-            <a:fillRect/>
-          </a:stretch>
-        </p:blipFill>
-        <p:spPr>
-          <a:xfrm>
-            <a:off x="2034475" y="2504049"/>
-            <a:ext cx="8119872" cy="4112456"/>
-          </a:xfrm>
-          <a:prstGeom prst="rect">
-            <a:avLst/>
-          </a:prstGeom>
-        </p:spPr>
-      </p:pic>
-    </p:spTree>
-    <p:extLst>
-      <p:ext uri="{BB962C8B-B14F-4D97-AF65-F5344CB8AC3E}">
-        <p14:creationId xmlns:p14="http://schemas.microsoft.com/office/powerpoint/2010/main" val="2864139903"/>
       </p:ext>
     </p:extLst>
   </p:cSld>

</xml_diff>